<commit_message>
Update slide deck for Ex 2
</commit_message>
<xml_diff>
--- a/02-appcatalogs.pptx
+++ b/02-appcatalogs.pptx
@@ -266,7 +266,7 @@
               <a:rPr lang="en-US" smtClean="0">
                 <a:latin typeface="Segoe UI" pitchFamily="34" charset="0"/>
               </a:rPr>
-              <a:t>3/14/19 1:45 PM</a:t>
+              <a:t>6/9/2019 2:04 PM</a:t>
             </a:fld>
             <a:endParaRPr lang="en-US" dirty="0">
               <a:latin typeface="Segoe UI" pitchFamily="34" charset="0"/>
@@ -563,7 +563,7 @@
           <a:p>
             <a:fld id="{D18B56EA-E28F-4F92-9F16-7A6F2501B303}" type="datetime8">
               <a:rPr lang="en-US" smtClean="0"/>
-              <a:t>3/14/19 1:45 PM</a:t>
+              <a:t>6/9/2019 2:04 PM</a:t>
             </a:fld>
             <a:endParaRPr lang="en-US" dirty="0"/>
           </a:p>
@@ -946,7 +946,7 @@
           <a:p>
             <a:fld id="{D18B56EA-E28F-4F92-9F16-7A6F2501B303}" type="datetime8">
               <a:rPr lang="en-US" smtClean="0"/>
-              <a:t>3/14/19 1:46 PM</a:t>
+              <a:t>6/9/2019 2:04 PM</a:t>
             </a:fld>
             <a:endParaRPr lang="en-US" dirty="0"/>
           </a:p>
@@ -1127,7 +1127,7 @@
           <a:p>
             <a:fld id="{D18B56EA-E28F-4F92-9F16-7A6F2501B303}" type="datetime8">
               <a:rPr lang="en-US" smtClean="0"/>
-              <a:t>3/14/19 2:49 PM</a:t>
+              <a:t>6/9/2019 2:04 PM</a:t>
             </a:fld>
             <a:endParaRPr lang="en-US" dirty="0"/>
           </a:p>
@@ -1474,7 +1474,7 @@
           <a:p>
             <a:fld id="{D18B56EA-E28F-4F92-9F16-7A6F2501B303}" type="datetime8">
               <a:rPr lang="en-US" smtClean="0"/>
-              <a:t>3/14/19 3:24 PM</a:t>
+              <a:t>6/9/2019 2:04 PM</a:t>
             </a:fld>
             <a:endParaRPr lang="en-US" dirty="0"/>
           </a:p>
@@ -1655,7 +1655,7 @@
           <a:p>
             <a:fld id="{D18B56EA-E28F-4F92-9F16-7A6F2501B303}" type="datetime8">
               <a:rPr lang="en-US" smtClean="0"/>
-              <a:t>3/14/19 2:48 PM</a:t>
+              <a:t>6/9/2019 2:04 PM</a:t>
             </a:fld>
             <a:endParaRPr lang="en-US" dirty="0"/>
           </a:p>
@@ -1836,7 +1836,7 @@
           <a:p>
             <a:fld id="{D18B56EA-E28F-4F92-9F16-7A6F2501B303}" type="datetime8">
               <a:rPr lang="en-US" smtClean="0"/>
-              <a:t>3/14/19 2:52 PM</a:t>
+              <a:t>6/9/2019 2:04 PM</a:t>
             </a:fld>
             <a:endParaRPr lang="en-US" dirty="0"/>
           </a:p>
@@ -2017,7 +2017,7 @@
           <a:p>
             <a:fld id="{D18B56EA-E28F-4F92-9F16-7A6F2501B303}" type="datetime8">
               <a:rPr lang="en-US" smtClean="0"/>
-              <a:t>3/14/19 1:45 PM</a:t>
+              <a:t>6/9/2019 2:04 PM</a:t>
             </a:fld>
             <a:endParaRPr lang="en-US" dirty="0"/>
           </a:p>
@@ -2198,7 +2198,7 @@
           <a:p>
             <a:fld id="{D18B56EA-E28F-4F92-9F16-7A6F2501B303}" type="datetime8">
               <a:rPr lang="en-US" smtClean="0"/>
-              <a:t>3/14/19 1:45 PM</a:t>
+              <a:t>6/9/2019 2:04 PM</a:t>
             </a:fld>
             <a:endParaRPr lang="en-US" dirty="0"/>
           </a:p>
@@ -15732,15 +15732,7 @@
             <a:pPr lvl="1"/>
             <a:r>
               <a:rPr lang="en-US" dirty="0"/>
-              <a:t>Does not apply to SharePoint Framework extensions (app customizers / field </a:t>
-            </a:r>
-            <a:r>
-              <a:rPr lang="en-US" dirty="0" err="1"/>
-              <a:t>customiers</a:t>
-            </a:r>
-            <a:r>
-              <a:rPr lang="en-US" dirty="0"/>
-              <a:t> / command sets)</a:t>
+              <a:t>Does not apply to SharePoint Framework extensions (app customizers / field customizers / command sets)</a:t>
             </a:r>
           </a:p>
         </p:txBody>

</xml_diff>

<commit_message>
FY22Q2 refresh - sharepoint-spfx-deployment
- run through all exercise steps in associated MSLearn module to validate good working order
- updated steps & fixed typos where necessary
- updated slides where necessary
- update code samples to reflect MSLearn HOL exercise refresh & updates
- any & all users/names/company names/pictures/IDs are not real people/tenants... all are from M365 demo tenants provided by Microsoft
</commit_message>
<xml_diff>
--- a/02-appcatalogs.pptx
+++ b/02-appcatalogs.pptx
@@ -266,7 +266,7 @@
               <a:rPr lang="en-US" smtClean="0">
                 <a:latin typeface="Segoe UI" pitchFamily="34" charset="0"/>
               </a:rPr>
-              <a:t>5/27/2021 12:25 PM</a:t>
+              <a:t>11/13/2021 9:17 AM</a:t>
             </a:fld>
             <a:endParaRPr lang="en-US" dirty="0">
               <a:latin typeface="Segoe UI" pitchFamily="34" charset="0"/>
@@ -563,7 +563,7 @@
           <a:p>
             <a:fld id="{D18B56EA-E28F-4F92-9F16-7A6F2501B303}" type="datetime8">
               <a:rPr lang="en-US" smtClean="0"/>
-              <a:t>5/27/2021 12:25 PM</a:t>
+              <a:t>11/13/2021 9:17 AM</a:t>
             </a:fld>
             <a:endParaRPr lang="en-US" dirty="0"/>
           </a:p>
@@ -946,7 +946,7 @@
           <a:p>
             <a:fld id="{D18B56EA-E28F-4F92-9F16-7A6F2501B303}" type="datetime8">
               <a:rPr lang="en-US" smtClean="0"/>
-              <a:t>5/27/2021 12:25 PM</a:t>
+              <a:t>11/13/2021 9:17 AM</a:t>
             </a:fld>
             <a:endParaRPr lang="en-US" dirty="0"/>
           </a:p>
@@ -1127,7 +1127,7 @@
           <a:p>
             <a:fld id="{D18B56EA-E28F-4F92-9F16-7A6F2501B303}" type="datetime8">
               <a:rPr lang="en-US" smtClean="0"/>
-              <a:t>5/27/2021 12:25 PM</a:t>
+              <a:t>11/13/2021 9:17 AM</a:t>
             </a:fld>
             <a:endParaRPr lang="en-US" dirty="0"/>
           </a:p>
@@ -1308,7 +1308,7 @@
           <a:p>
             <a:fld id="{D18B56EA-E28F-4F92-9F16-7A6F2501B303}" type="datetime8">
               <a:rPr lang="en-US" smtClean="0"/>
-              <a:t>5/27/2021 12:25 PM</a:t>
+              <a:t>11/13/2021 9:17 AM</a:t>
             </a:fld>
             <a:endParaRPr lang="en-US" dirty="0"/>
           </a:p>
@@ -1525,7 +1525,7 @@
           <a:p>
             <a:fld id="{D18B56EA-E28F-4F92-9F16-7A6F2501B303}" type="datetime8">
               <a:rPr lang="en-US" smtClean="0"/>
-              <a:t>5/27/2021 12:25 PM</a:t>
+              <a:t>11/13/2021 9:17 AM</a:t>
             </a:fld>
             <a:endParaRPr lang="en-US" dirty="0"/>
           </a:p>
@@ -1948,7 +1948,7 @@
           <a:p>
             <a:fld id="{D18B56EA-E28F-4F92-9F16-7A6F2501B303}" type="datetime8">
               <a:rPr lang="en-US" smtClean="0"/>
-              <a:t>5/27/2021 12:25 PM</a:t>
+              <a:t>11/13/2021 9:17 AM</a:t>
             </a:fld>
             <a:endParaRPr lang="en-US" dirty="0"/>
           </a:p>
@@ -2172,7 +2172,7 @@
           <a:p>
             <a:fld id="{D18B56EA-E28F-4F92-9F16-7A6F2501B303}" type="datetime8">
               <a:rPr lang="en-US" smtClean="0"/>
-              <a:t>5/27/2021 12:25 PM</a:t>
+              <a:t>11/13/2021 9:17 AM</a:t>
             </a:fld>
             <a:endParaRPr lang="en-US" dirty="0"/>
           </a:p>
@@ -2386,7 +2386,7 @@
           <a:p>
             <a:fld id="{D18B56EA-E28F-4F92-9F16-7A6F2501B303}" type="datetime8">
               <a:rPr lang="en-US" smtClean="0"/>
-              <a:t>5/27/2021 12:25 PM</a:t>
+              <a:t>11/13/2021 9:17 AM</a:t>
             </a:fld>
             <a:endParaRPr lang="en-US" dirty="0"/>
           </a:p>
@@ -2637,7 +2637,7 @@
           <a:p>
             <a:fld id="{D18B56EA-E28F-4F92-9F16-7A6F2501B303}" type="datetime8">
               <a:rPr lang="en-US" smtClean="0"/>
-              <a:t>5/27/2021 12:25 PM</a:t>
+              <a:t>11/13/2021 9:17 AM</a:t>
             </a:fld>
             <a:endParaRPr lang="en-US" dirty="0"/>
           </a:p>
@@ -2818,7 +2818,7 @@
           <a:p>
             <a:fld id="{D18B56EA-E28F-4F92-9F16-7A6F2501B303}" type="datetime8">
               <a:rPr lang="en-US" smtClean="0"/>
-              <a:t>5/27/2021 12:25 PM</a:t>
+              <a:t>11/13/2021 9:17 AM</a:t>
             </a:fld>
             <a:endParaRPr lang="en-US" dirty="0"/>
           </a:p>
@@ -2999,7 +2999,7 @@
           <a:p>
             <a:fld id="{D18B56EA-E28F-4F92-9F16-7A6F2501B303}" type="datetime8">
               <a:rPr lang="en-US" smtClean="0"/>
-              <a:t>5/27/2021 12:25 PM</a:t>
+              <a:t>11/13/2021 9:17 AM</a:t>
             </a:fld>
             <a:endParaRPr lang="en-US" dirty="0"/>
           </a:p>
@@ -16896,11 +16896,23 @@
               <a:rPr lang="en-US" dirty="0">
                 <a:hlinkClick r:id="rId4"/>
               </a:rPr>
-              <a:t>https://pnp.github.io/office365-cli</a:t>
-            </a:r>
-            <a:r>
-              <a:rPr lang="en-US" dirty="0"/>
-              <a:t> </a:t>
+              <a:t>https://pnp.github.io/cli-microsoft365</a:t>
+            </a:r>
+            <a:r>
+              <a:rPr lang="en-US" dirty="0"/>
+              <a:t> </a:t>
+            </a:r>
+          </a:p>
+          <a:p>
+            <a:pPr marL="228600" lvl="1" indent="0">
+              <a:buNone/>
+            </a:pPr>
+            <a:r>
+              <a:rPr lang="en-US" sz="1600" dirty="0">
+                <a:latin typeface="Courier New" panose="02070309020205020404" pitchFamily="49" charset="0"/>
+                <a:cs typeface="Courier New" panose="02070309020205020404" pitchFamily="49" charset="0"/>
+              </a:rPr>
+              <a:t>$ m365 login</a:t>
             </a:r>
           </a:p>
           <a:p>
@@ -16915,97 +16927,18 @@
               <a:t>$ </a:t>
             </a:r>
             <a:r>
-              <a:rPr lang="en-US" sz="1600" dirty="0" err="1">
+              <a:rPr lang="it-IT" sz="1600" dirty="0">
                 <a:latin typeface="Courier New" panose="02070309020205020404" pitchFamily="49" charset="0"/>
                 <a:cs typeface="Courier New" panose="02070309020205020404" pitchFamily="49" charset="0"/>
               </a:rPr>
-              <a:t>spo</a:t>
+              <a:t>m365 spo site appcatalog add --url</a:t>
             </a:r>
             <a:r>
               <a:rPr lang="en-US" sz="1600" dirty="0">
                 <a:latin typeface="Courier New" panose="02070309020205020404" pitchFamily="49" charset="0"/>
                 <a:cs typeface="Courier New" panose="02070309020205020404" pitchFamily="49" charset="0"/>
               </a:rPr>
-              <a:t> connect https://</a:t>
-            </a:r>
-            <a:r>
-              <a:rPr lang="en-US" sz="1600" dirty="0" err="1">
-                <a:latin typeface="Courier New" panose="02070309020205020404" pitchFamily="49" charset="0"/>
-                <a:cs typeface="Courier New" panose="02070309020205020404" pitchFamily="49" charset="0"/>
-              </a:rPr>
-              <a:t>contoso-admin.sharepoint.com</a:t>
-            </a:r>
-            <a:endParaRPr lang="en-US" sz="1600" dirty="0">
-              <a:latin typeface="Courier New" panose="02070309020205020404" pitchFamily="49" charset="0"/>
-              <a:cs typeface="Courier New" panose="02070309020205020404" pitchFamily="49" charset="0"/>
-            </a:endParaRPr>
-          </a:p>
-          <a:p>
-            <a:pPr marL="228600" lvl="1" indent="0">
-              <a:buNone/>
-            </a:pPr>
-            <a:r>
-              <a:rPr lang="en-US" sz="1600" dirty="0">
-                <a:latin typeface="Courier New" panose="02070309020205020404" pitchFamily="49" charset="0"/>
-                <a:cs typeface="Courier New" panose="02070309020205020404" pitchFamily="49" charset="0"/>
-              </a:rPr>
-              <a:t>$ </a:t>
-            </a:r>
-            <a:r>
-              <a:rPr lang="en-US" sz="1600" dirty="0" err="1">
-                <a:latin typeface="Courier New" panose="02070309020205020404" pitchFamily="49" charset="0"/>
-                <a:cs typeface="Courier New" panose="02070309020205020404" pitchFamily="49" charset="0"/>
-              </a:rPr>
-              <a:t>spo</a:t>
-            </a:r>
-            <a:r>
-              <a:rPr lang="en-US" sz="1600" dirty="0">
-                <a:latin typeface="Courier New" panose="02070309020205020404" pitchFamily="49" charset="0"/>
-                <a:cs typeface="Courier New" panose="02070309020205020404" pitchFamily="49" charset="0"/>
-              </a:rPr>
-              <a:t> site </a:t>
-            </a:r>
-            <a:r>
-              <a:rPr lang="en-US" sz="1600" dirty="0" err="1">
-                <a:latin typeface="Courier New" panose="02070309020205020404" pitchFamily="49" charset="0"/>
-                <a:cs typeface="Courier New" panose="02070309020205020404" pitchFamily="49" charset="0"/>
-              </a:rPr>
-              <a:t>appcatalog</a:t>
-            </a:r>
-            <a:r>
-              <a:rPr lang="en-US" sz="1600" dirty="0">
-                <a:latin typeface="Courier New" panose="02070309020205020404" pitchFamily="49" charset="0"/>
-                <a:cs typeface="Courier New" panose="02070309020205020404" pitchFamily="49" charset="0"/>
-              </a:rPr>
-              <a:t> add --</a:t>
-            </a:r>
-            <a:r>
-              <a:rPr lang="en-US" sz="1600" dirty="0" err="1">
-                <a:latin typeface="Courier New" panose="02070309020205020404" pitchFamily="49" charset="0"/>
-                <a:cs typeface="Courier New" panose="02070309020205020404" pitchFamily="49" charset="0"/>
-              </a:rPr>
-              <a:t>url</a:t>
-            </a:r>
-            <a:r>
-              <a:rPr lang="en-US" sz="1600" dirty="0">
-                <a:latin typeface="Courier New" panose="02070309020205020404" pitchFamily="49" charset="0"/>
-                <a:cs typeface="Courier New" panose="02070309020205020404" pitchFamily="49" charset="0"/>
-              </a:rPr>
-              <a:t> https://</a:t>
-            </a:r>
-            <a:r>
-              <a:rPr lang="en-US" sz="1600" dirty="0" err="1">
-                <a:latin typeface="Courier New" panose="02070309020205020404" pitchFamily="49" charset="0"/>
-                <a:cs typeface="Courier New" panose="02070309020205020404" pitchFamily="49" charset="0"/>
-              </a:rPr>
-              <a:t>contoso.sharepoint</a:t>
-            </a:r>
-            <a:r>
-              <a:rPr lang="en-US" sz="1600" dirty="0">
-                <a:latin typeface="Courier New" panose="02070309020205020404" pitchFamily="49" charset="0"/>
-                <a:cs typeface="Courier New" panose="02070309020205020404" pitchFamily="49" charset="0"/>
-              </a:rPr>
-              <a:t>/sites/test-site</a:t>
+              <a:t> https://contoso.sharepoint/sites/test-site</a:t>
             </a:r>
           </a:p>
         </p:txBody>
@@ -17248,7 +17181,7 @@
               <a:rPr lang="en-US" dirty="0">
                 <a:hlinkClick r:id="rId4"/>
               </a:rPr>
-              <a:t>https://pnp.github.io/office365-cli</a:t>
+              <a:t>https://pnp.github.io/cli-microsoft365</a:t>
             </a:r>
             <a:r>
               <a:rPr lang="en-US" dirty="0"/>
@@ -17264,7 +17197,19 @@
                 <a:latin typeface="Courier New" panose="02070309020205020404" pitchFamily="49" charset="0"/>
                 <a:cs typeface="Courier New" panose="02070309020205020404" pitchFamily="49" charset="0"/>
               </a:rPr>
-              <a:t>$ </a:t>
+              <a:t>$ m365 login</a:t>
+            </a:r>
+          </a:p>
+          <a:p>
+            <a:pPr marL="228600" lvl="1" indent="0">
+              <a:buNone/>
+            </a:pPr>
+            <a:r>
+              <a:rPr lang="en-US" sz="1600" dirty="0">
+                <a:latin typeface="Courier New" panose="02070309020205020404" pitchFamily="49" charset="0"/>
+                <a:cs typeface="Courier New" panose="02070309020205020404" pitchFamily="49" charset="0"/>
+              </a:rPr>
+              <a:t>$ m365 </a:t>
             </a:r>
             <a:r>
               <a:rPr lang="en-US" sz="1600" dirty="0" err="1">
@@ -17278,43 +17223,6 @@
                 <a:latin typeface="Courier New" panose="02070309020205020404" pitchFamily="49" charset="0"/>
                 <a:cs typeface="Courier New" panose="02070309020205020404" pitchFamily="49" charset="0"/>
               </a:rPr>
-              <a:t> connect https://</a:t>
-            </a:r>
-            <a:r>
-              <a:rPr lang="en-US" sz="1600" dirty="0" err="1">
-                <a:latin typeface="Courier New" panose="02070309020205020404" pitchFamily="49" charset="0"/>
-                <a:cs typeface="Courier New" panose="02070309020205020404" pitchFamily="49" charset="0"/>
-              </a:rPr>
-              <a:t>contoso-admin.sharepoint.com</a:t>
-            </a:r>
-            <a:endParaRPr lang="en-US" sz="1600" dirty="0">
-              <a:latin typeface="Courier New" panose="02070309020205020404" pitchFamily="49" charset="0"/>
-              <a:cs typeface="Courier New" panose="02070309020205020404" pitchFamily="49" charset="0"/>
-            </a:endParaRPr>
-          </a:p>
-          <a:p>
-            <a:pPr marL="228600" lvl="1" indent="0">
-              <a:buNone/>
-            </a:pPr>
-            <a:r>
-              <a:rPr lang="en-US" sz="1600" dirty="0">
-                <a:latin typeface="Courier New" panose="02070309020205020404" pitchFamily="49" charset="0"/>
-                <a:cs typeface="Courier New" panose="02070309020205020404" pitchFamily="49" charset="0"/>
-              </a:rPr>
-              <a:t>$ </a:t>
-            </a:r>
-            <a:r>
-              <a:rPr lang="en-US" sz="1600" dirty="0" err="1">
-                <a:latin typeface="Courier New" panose="02070309020205020404" pitchFamily="49" charset="0"/>
-                <a:cs typeface="Courier New" panose="02070309020205020404" pitchFamily="49" charset="0"/>
-              </a:rPr>
-              <a:t>spo</a:t>
-            </a:r>
-            <a:r>
-              <a:rPr lang="en-US" sz="1600" dirty="0">
-                <a:latin typeface="Courier New" panose="02070309020205020404" pitchFamily="49" charset="0"/>
-                <a:cs typeface="Courier New" panose="02070309020205020404" pitchFamily="49" charset="0"/>
-              </a:rPr>
               <a:t> site </a:t>
             </a:r>
             <a:r>
@@ -17343,21 +17251,7 @@
                 <a:latin typeface="Courier New" panose="02070309020205020404" pitchFamily="49" charset="0"/>
                 <a:cs typeface="Courier New" panose="02070309020205020404" pitchFamily="49" charset="0"/>
               </a:rPr>
-              <a:t> https://</a:t>
-            </a:r>
-            <a:r>
-              <a:rPr lang="en-US" sz="1600" dirty="0" err="1">
-                <a:latin typeface="Courier New" panose="02070309020205020404" pitchFamily="49" charset="0"/>
-                <a:cs typeface="Courier New" panose="02070309020205020404" pitchFamily="49" charset="0"/>
-              </a:rPr>
-              <a:t>contoso.sharepoint</a:t>
-            </a:r>
-            <a:r>
-              <a:rPr lang="en-US" sz="1600" dirty="0">
-                <a:latin typeface="Courier New" panose="02070309020205020404" pitchFamily="49" charset="0"/>
-                <a:cs typeface="Courier New" panose="02070309020205020404" pitchFamily="49" charset="0"/>
-              </a:rPr>
-              <a:t>/sites/test-site</a:t>
+              <a:t> https://contoso.sharepoint/sites/test-site</a:t>
             </a:r>
           </a:p>
           <a:p>

</xml_diff>